<commit_message>
minor change to formulae
</commit_message>
<xml_diff>
--- a/presentation.pptx
+++ b/presentation.pptx
@@ -3181,7 +3181,7 @@
       </p:grpSpPr>
       <p:sp>
         <p:nvSpPr>
-          <p:cNvPr id="165" name="Multi asset barrier sensitivities"/>
+          <p:cNvPr id="164" name="Multi asset barrier sensitivities"/>
           <p:cNvSpPr txBox="1"/>
           <p:nvPr>
             <p:ph type="title"/>
@@ -3209,7 +3209,7 @@
       </p:sp>
       <p:sp>
         <p:nvSpPr>
-          <p:cNvPr id="166" name="Multi asset barrier is the minimum of each barrier option.…"/>
+          <p:cNvPr id="165" name="Multi asset barrier is the minimum of each barrier option.…"/>
           <p:cNvSpPr txBox="1"/>
           <p:nvPr>
             <p:ph type="body" sz="quarter" idx="1"/>
@@ -3253,7 +3253,7 @@
       </p:sp>
       <p:pic>
         <p:nvPicPr>
-          <p:cNvPr id="167" name="sigma_barrier_large_contour.pdf" descr="sigma_barrier_large_contour.pdf"/>
+          <p:cNvPr id="166" name="sigma_barrier_large_contour.pdf" descr="sigma_barrier_large_contour.pdf"/>
           <p:cNvPicPr>
             <a:picLocks noChangeAspect="1"/>
           </p:cNvPicPr>
@@ -3282,7 +3282,7 @@
       </p:pic>
       <p:pic>
         <p:nvPicPr>
-          <p:cNvPr id="168" name="sigma_barrier_large.pdf" descr="sigma_barrier_large.pdf"/>
+          <p:cNvPr id="167" name="sigma_barrier_large.pdf" descr="sigma_barrier_large.pdf"/>
           <p:cNvPicPr>
             <a:picLocks noChangeAspect="1"/>
           </p:cNvPicPr>
@@ -3337,7 +3337,7 @@
       </p:grpSpPr>
       <p:sp>
         <p:nvSpPr>
-          <p:cNvPr id="170" name="Pricing barrier options on Nasdaq"/>
+          <p:cNvPr id="169" name="Pricing barrier options on Nasdaq"/>
           <p:cNvSpPr txBox="1"/>
           <p:nvPr>
             <p:ph type="title"/>
@@ -3365,7 +3365,7 @@
       </p:sp>
       <p:sp>
         <p:nvSpPr>
-          <p:cNvPr id="171" name="r = 0.05; T = 1.0; B* = 1.3…"/>
+          <p:cNvPr id="170" name="r = 0.05; T = 1.0; B* = 1.3…"/>
           <p:cNvSpPr txBox="1"/>
           <p:nvPr>
             <p:ph type="body" sz="quarter" idx="1"/>
@@ -3409,7 +3409,7 @@
       </p:sp>
       <p:pic>
         <p:nvPicPr>
-          <p:cNvPr id="172" name="barrier_heatmap_nasdaq.pdf" descr="barrier_heatmap_nasdaq.pdf"/>
+          <p:cNvPr id="171" name="barrier_heatmap_nasdaq.pdf" descr="barrier_heatmap_nasdaq.pdf"/>
           <p:cNvPicPr>
             <a:picLocks noChangeAspect="1"/>
           </p:cNvPicPr>
@@ -3464,7 +3464,7 @@
       </p:grpSpPr>
       <p:sp>
         <p:nvSpPr>
-          <p:cNvPr id="174" name="Thank  you"/>
+          <p:cNvPr id="173" name="Thank  you"/>
           <p:cNvSpPr txBox="1"/>
           <p:nvPr>
             <p:ph type="title"/>
@@ -3488,7 +3488,7 @@
       </p:sp>
       <p:sp>
         <p:nvSpPr>
-          <p:cNvPr id="175" name="Further topics include:…"/>
+          <p:cNvPr id="174" name="Further topics include:…"/>
           <p:cNvSpPr txBox="1"/>
           <p:nvPr>
             <p:ph type="body" idx="1"/>
@@ -3556,7 +3556,7 @@
       </p:grpSpPr>
       <p:sp>
         <p:nvSpPr>
-          <p:cNvPr id="177" name="Variance Reduction"/>
+          <p:cNvPr id="176" name="Variance Reduction"/>
           <p:cNvSpPr txBox="1"/>
           <p:nvPr>
             <p:ph type="title"/>
@@ -3580,7 +3580,7 @@
       </p:sp>
       <p:sp>
         <p:nvSpPr>
-          <p:cNvPr id="178" name="Antithetic variables"/>
+          <p:cNvPr id="177" name="Antithetic variables"/>
           <p:cNvSpPr txBox="1"/>
           <p:nvPr>
             <p:ph type="body" sz="quarter" idx="1"/>
@@ -3608,7 +3608,7 @@
       </p:sp>
       <p:pic>
         <p:nvPicPr>
-          <p:cNvPr id="179" name="standard_antithetic_std.pdf" descr="standard_antithetic_std.pdf"/>
+          <p:cNvPr id="178" name="standard_antithetic_std.pdf" descr="standard_antithetic_std.pdf"/>
           <p:cNvPicPr>
             <a:picLocks noChangeAspect="1"/>
           </p:cNvPicPr>
@@ -4128,30 +4128,9 @@
           </a:p>
         </p:txBody>
       </p:sp>
-      <p:sp>
-        <p:nvSpPr>
-          <p:cNvPr id="139" name="Body"/>
-          <p:cNvSpPr txBox="1"/>
-          <p:nvPr>
-            <p:ph type="body" idx="1"/>
-          </p:nvPr>
-        </p:nvSpPr>
-        <p:spPr>
-          <a:prstGeom prst="rect">
-            <a:avLst/>
-          </a:prstGeom>
-        </p:spPr>
-        <p:txBody>
-          <a:bodyPr/>
-          <a:lstStyle/>
-          <a:p>
-            <a:pPr/>
-          </a:p>
-        </p:txBody>
-      </p:sp>
       <p:pic>
         <p:nvPicPr>
-          <p:cNvPr id="140" name="pasted-image.pdf" descr="pasted-image.pdf"/>
+          <p:cNvPr id="139" name="simulated_price.pdf" descr="simulated_price.pdf"/>
           <p:cNvPicPr>
             <a:picLocks noChangeAspect="1"/>
           </p:cNvPicPr>
@@ -4167,8 +4146,8 @@
         </p:blipFill>
         <p:spPr>
           <a:xfrm>
-            <a:off x="3759200" y="2895600"/>
-            <a:ext cx="5486400" cy="1003300"/>
+            <a:off x="949870" y="4576414"/>
+            <a:ext cx="5270502" cy="4000503"/>
           </a:xfrm>
           <a:prstGeom prst="rect">
             <a:avLst/>
@@ -4180,7 +4159,7 @@
       </p:pic>
       <p:pic>
         <p:nvPicPr>
-          <p:cNvPr id="141" name="simulated_price.pdf" descr="simulated_price.pdf"/>
+          <p:cNvPr id="140" name="Screen Shot 2017-10-01 at 10.24.14.png" descr="Screen Shot 2017-10-01 at 10.24.14.png"/>
           <p:cNvPicPr>
             <a:picLocks noChangeAspect="1"/>
           </p:cNvPicPr>
@@ -4196,8 +4175,8 @@
         </p:blipFill>
         <p:spPr>
           <a:xfrm>
-            <a:off x="949870" y="4576414"/>
-            <a:ext cx="5270502" cy="4000503"/>
+            <a:off x="6248398" y="5168900"/>
+            <a:ext cx="5780679" cy="2273300"/>
           </a:xfrm>
           <a:prstGeom prst="rect">
             <a:avLst/>
@@ -4209,7 +4188,7 @@
       </p:pic>
       <p:pic>
         <p:nvPicPr>
-          <p:cNvPr id="142" name="Screen Shot 2017-10-01 at 10.24.14.png" descr="Screen Shot 2017-10-01 at 10.24.14.png"/>
+          <p:cNvPr id="141" name="pasted-image.pdf" descr="pasted-image.pdf"/>
           <p:cNvPicPr>
             <a:picLocks noChangeAspect="1"/>
           </p:cNvPicPr>
@@ -4225,8 +4204,8 @@
         </p:blipFill>
         <p:spPr>
           <a:xfrm>
-            <a:off x="6248398" y="5168900"/>
-            <a:ext cx="5780679" cy="2273300"/>
+            <a:off x="3448050" y="2813050"/>
+            <a:ext cx="6108700" cy="1003300"/>
           </a:xfrm>
           <a:prstGeom prst="rect">
             <a:avLst/>
@@ -4264,7 +4243,7 @@
       </p:grpSpPr>
       <p:sp>
         <p:nvSpPr>
-          <p:cNvPr id="144" name="Pricing a knock out call option"/>
+          <p:cNvPr id="143" name="Pricing a knock out call option"/>
           <p:cNvSpPr txBox="1"/>
           <p:nvPr>
             <p:ph type="title"/>
@@ -4292,7 +4271,7 @@
       </p:sp>
       <p:pic>
         <p:nvPicPr>
-          <p:cNvPr id="145" name="barrier_option.pdf" descr="barrier_option.pdf"/>
+          <p:cNvPr id="144" name="barrier_option.pdf" descr="barrier_option.pdf"/>
           <p:cNvPicPr>
             <a:picLocks noChangeAspect="1"/>
           </p:cNvPicPr>
@@ -4321,7 +4300,7 @@
       </p:pic>
       <p:sp>
         <p:nvSpPr>
-          <p:cNvPr id="146" name="r = 0.05; T = 1.0; No dividends; S0 = 100; K = 100;…"/>
+          <p:cNvPr id="145" name="r = 0.05; T = 1.0; No dividends; S0 = 100; K = 100;…"/>
           <p:cNvSpPr txBox="1"/>
           <p:nvPr>
             <p:ph type="body" sz="quarter" idx="1"/>
@@ -4402,7 +4381,7 @@
       </p:grpSpPr>
       <p:sp>
         <p:nvSpPr>
-          <p:cNvPr id="148" name="Central limit theorem"/>
+          <p:cNvPr id="147" name="Central limit theorem"/>
           <p:cNvSpPr txBox="1"/>
           <p:nvPr>
             <p:ph type="title"/>
@@ -4426,7 +4405,7 @@
       </p:sp>
       <p:sp>
         <p:nvSpPr>
-          <p:cNvPr id="149" name="More runs result in more accurate answers…"/>
+          <p:cNvPr id="148" name="More runs result in more accurate answers…"/>
           <p:cNvSpPr txBox="1"/>
           <p:nvPr>
             <p:ph type="body" sz="quarter" idx="1"/>
@@ -4460,7 +4439,7 @@
       </p:sp>
       <p:pic>
         <p:nvPicPr>
-          <p:cNvPr id="150" name="barrier_option.pdf" descr="barrier_option.pdf"/>
+          <p:cNvPr id="149" name="barrier_option.pdf" descr="barrier_option.pdf"/>
           <p:cNvPicPr>
             <a:picLocks noChangeAspect="1"/>
           </p:cNvPicPr>
@@ -4489,7 +4468,7 @@
       </p:pic>
       <p:pic>
         <p:nvPicPr>
-          <p:cNvPr id="151" name="standard_deviation.pdf" descr="standard_deviation.pdf"/>
+          <p:cNvPr id="150" name="standard_deviation.pdf" descr="standard_deviation.pdf"/>
           <p:cNvPicPr>
             <a:picLocks noChangeAspect="1"/>
           </p:cNvPicPr>
@@ -4544,7 +4523,7 @@
       </p:grpSpPr>
       <p:sp>
         <p:nvSpPr>
-          <p:cNvPr id="153" name="Generate samples from multivariate distribution"/>
+          <p:cNvPr id="152" name="Generate samples from multivariate distribution"/>
           <p:cNvSpPr txBox="1"/>
           <p:nvPr>
             <p:ph type="title"/>
@@ -4572,7 +4551,7 @@
       </p:sp>
       <p:sp>
         <p:nvSpPr>
-          <p:cNvPr id="154" name="Use Cholesky decomposition"/>
+          <p:cNvPr id="153" name="Use Cholesky decomposition"/>
           <p:cNvSpPr txBox="1"/>
           <p:nvPr>
             <p:ph type="body" sz="quarter" idx="1"/>
@@ -4600,7 +4579,7 @@
       </p:sp>
       <p:pic>
         <p:nvPicPr>
-          <p:cNvPr id="155" name="pasted-image.pdf" descr="pasted-image.pdf"/>
+          <p:cNvPr id="154" name="pasted-image.pdf" descr="pasted-image.pdf"/>
           <p:cNvPicPr>
             <a:picLocks noChangeAspect="1"/>
           </p:cNvPicPr>
@@ -4629,7 +4608,7 @@
       </p:pic>
       <p:pic>
         <p:nvPicPr>
-          <p:cNvPr id="156" name="pasted-image.pdf" descr="pasted-image.pdf"/>
+          <p:cNvPr id="155" name="pasted-image.pdf" descr="pasted-image.pdf"/>
           <p:cNvPicPr>
             <a:picLocks noChangeAspect="1"/>
           </p:cNvPicPr>
@@ -4658,7 +4637,7 @@
       </p:pic>
       <p:pic>
         <p:nvPicPr>
-          <p:cNvPr id="157" name="multi_simulated_price.pdf" descr="multi_simulated_price.pdf"/>
+          <p:cNvPr id="156" name="multi_simulated_price.pdf" descr="multi_simulated_price.pdf"/>
           <p:cNvPicPr>
             <a:picLocks noChangeAspect="1"/>
           </p:cNvPicPr>
@@ -4687,7 +4666,7 @@
       </p:pic>
       <p:pic>
         <p:nvPicPr>
-          <p:cNvPr id="158" name="pasted-image.pdf" descr="pasted-image.pdf"/>
+          <p:cNvPr id="157" name="pasted-image.pdf" descr="pasted-image.pdf"/>
           <p:cNvPicPr>
             <a:picLocks noChangeAspect="1"/>
           </p:cNvPicPr>
@@ -4742,7 +4721,7 @@
       </p:grpSpPr>
       <p:sp>
         <p:nvSpPr>
-          <p:cNvPr id="160" name="Multi asset barrier sensitivities"/>
+          <p:cNvPr id="159" name="Multi asset barrier sensitivities"/>
           <p:cNvSpPr txBox="1"/>
           <p:nvPr>
             <p:ph type="title"/>
@@ -4770,7 +4749,7 @@
       </p:sp>
       <p:sp>
         <p:nvSpPr>
-          <p:cNvPr id="161" name="Multi asset barrier is the minimum of each barrier option.…"/>
+          <p:cNvPr id="160" name="Multi asset barrier is the minimum of each barrier option.…"/>
           <p:cNvSpPr txBox="1"/>
           <p:nvPr>
             <p:ph type="body" sz="quarter" idx="1"/>
@@ -4814,7 +4793,7 @@
       </p:sp>
       <p:pic>
         <p:nvPicPr>
-          <p:cNvPr id="162" name="sigma_barrier_contour.pdf" descr="sigma_barrier_contour.pdf"/>
+          <p:cNvPr id="161" name="sigma_barrier_contour.pdf" descr="sigma_barrier_contour.pdf"/>
           <p:cNvPicPr>
             <a:picLocks noChangeAspect="1"/>
           </p:cNvPicPr>
@@ -4843,7 +4822,7 @@
       </p:pic>
       <p:pic>
         <p:nvPicPr>
-          <p:cNvPr id="163" name="sigma_barrier.pdf" descr="sigma_barrier.pdf"/>
+          <p:cNvPr id="162" name="sigma_barrier.pdf" descr="sigma_barrier.pdf"/>
           <p:cNvPicPr>
             <a:picLocks noChangeAspect="1"/>
           </p:cNvPicPr>

</xml_diff>